<commit_message>
add presentation for spring cloud config
</commit_message>
<xml_diff>
--- a/Techem Spring Cloud.pptx
+++ b/Techem Spring Cloud.pptx
@@ -211,7 +211,7 @@
           <a:p>
             <a:fld id="{85754AE8-F999-41F0-BA66-F96114617649}" type="datetimeFigureOut">
               <a:rPr lang="de-DE" smtClean="0"/>
-              <a:t>18.03.2020</a:t>
+              <a:t>19.03.2020</a:t>
             </a:fld>
             <a:endParaRPr lang="de-DE"/>
           </a:p>
@@ -1115,7 +1115,7 @@
           <p:cNvPr id="6" name="Datumsplatzhalter 5">
             <a:extLst>
               <a:ext uri="{FF2B5EF4-FFF2-40B4-BE49-F238E27FC236}">
-                <a16:creationId xmlns:a16="http://schemas.microsoft.com/office/drawing/2014/main" xmlns="" id="{9515FE13-AC0F-A441-BB41-B4977ED536C5}"/>
+                <a16:creationId xmlns="" xmlns:a16="http://schemas.microsoft.com/office/drawing/2014/main" id="{9515FE13-AC0F-A441-BB41-B4977ED536C5}"/>
               </a:ext>
             </a:extLst>
           </p:cNvPr>
@@ -1144,7 +1144,7 @@
           <p:cNvPr id="7" name="Fußzeilenplatzhalter 6">
             <a:extLst>
               <a:ext uri="{FF2B5EF4-FFF2-40B4-BE49-F238E27FC236}">
-                <a16:creationId xmlns:a16="http://schemas.microsoft.com/office/drawing/2014/main" xmlns="" id="{FF27A7FF-463E-204E-9CEC-A6AC5E74838D}"/>
+                <a16:creationId xmlns="" xmlns:a16="http://schemas.microsoft.com/office/drawing/2014/main" id="{FF27A7FF-463E-204E-9CEC-A6AC5E74838D}"/>
               </a:ext>
             </a:extLst>
           </p:cNvPr>
@@ -1173,7 +1173,7 @@
           <p:cNvPr id="8" name="Foliennummernplatzhalter 7">
             <a:extLst>
               <a:ext uri="{FF2B5EF4-FFF2-40B4-BE49-F238E27FC236}">
-                <a16:creationId xmlns:a16="http://schemas.microsoft.com/office/drawing/2014/main" xmlns="" id="{9B370C5F-9464-6349-ADA0-350E0E925858}"/>
+                <a16:creationId xmlns="" xmlns:a16="http://schemas.microsoft.com/office/drawing/2014/main" id="{9B370C5F-9464-6349-ADA0-350E0E925858}"/>
               </a:ext>
             </a:extLst>
           </p:cNvPr>
@@ -2128,7 +2128,7 @@
           <p:cNvPr id="8" name="Datumsplatzhalter 7">
             <a:extLst>
               <a:ext uri="{FF2B5EF4-FFF2-40B4-BE49-F238E27FC236}">
-                <a16:creationId xmlns:a16="http://schemas.microsoft.com/office/drawing/2014/main" xmlns="" id="{5C1633E4-9377-3D40-89DC-F89FB735A088}"/>
+                <a16:creationId xmlns="" xmlns:a16="http://schemas.microsoft.com/office/drawing/2014/main" id="{5C1633E4-9377-3D40-89DC-F89FB735A088}"/>
               </a:ext>
             </a:extLst>
           </p:cNvPr>
@@ -2157,7 +2157,7 @@
           <p:cNvPr id="9" name="Fußzeilenplatzhalter 8">
             <a:extLst>
               <a:ext uri="{FF2B5EF4-FFF2-40B4-BE49-F238E27FC236}">
-                <a16:creationId xmlns:a16="http://schemas.microsoft.com/office/drawing/2014/main" xmlns="" id="{66FB4C1B-6CE1-BA45-93E0-6EF594CC4F87}"/>
+                <a16:creationId xmlns="" xmlns:a16="http://schemas.microsoft.com/office/drawing/2014/main" id="{66FB4C1B-6CE1-BA45-93E0-6EF594CC4F87}"/>
               </a:ext>
             </a:extLst>
           </p:cNvPr>
@@ -2186,7 +2186,7 @@
           <p:cNvPr id="10" name="Foliennummernplatzhalter 9">
             <a:extLst>
               <a:ext uri="{FF2B5EF4-FFF2-40B4-BE49-F238E27FC236}">
-                <a16:creationId xmlns:a16="http://schemas.microsoft.com/office/drawing/2014/main" xmlns="" id="{F9D74992-862A-FD4F-9B7B-D381264DDE0D}"/>
+                <a16:creationId xmlns="" xmlns:a16="http://schemas.microsoft.com/office/drawing/2014/main" id="{F9D74992-862A-FD4F-9B7B-D381264DDE0D}"/>
               </a:ext>
             </a:extLst>
           </p:cNvPr>
@@ -2587,7 +2587,7 @@
           <p:cNvPr id="10" name="Datumsplatzhalter 9">
             <a:extLst>
               <a:ext uri="{FF2B5EF4-FFF2-40B4-BE49-F238E27FC236}">
-                <a16:creationId xmlns:a16="http://schemas.microsoft.com/office/drawing/2014/main" xmlns="" id="{8FBD8FD4-0261-AC4F-827E-9503172113F7}"/>
+                <a16:creationId xmlns="" xmlns:a16="http://schemas.microsoft.com/office/drawing/2014/main" id="{8FBD8FD4-0261-AC4F-827E-9503172113F7}"/>
               </a:ext>
             </a:extLst>
           </p:cNvPr>
@@ -2616,7 +2616,7 @@
           <p:cNvPr id="11" name="Fußzeilenplatzhalter 10">
             <a:extLst>
               <a:ext uri="{FF2B5EF4-FFF2-40B4-BE49-F238E27FC236}">
-                <a16:creationId xmlns:a16="http://schemas.microsoft.com/office/drawing/2014/main" xmlns="" id="{117D95D8-0AE8-044E-A3DE-D007B8CBFEF7}"/>
+                <a16:creationId xmlns="" xmlns:a16="http://schemas.microsoft.com/office/drawing/2014/main" id="{117D95D8-0AE8-044E-A3DE-D007B8CBFEF7}"/>
               </a:ext>
             </a:extLst>
           </p:cNvPr>
@@ -2645,7 +2645,7 @@
           <p:cNvPr id="12" name="Foliennummernplatzhalter 11">
             <a:extLst>
               <a:ext uri="{FF2B5EF4-FFF2-40B4-BE49-F238E27FC236}">
-                <a16:creationId xmlns:a16="http://schemas.microsoft.com/office/drawing/2014/main" xmlns="" id="{928E8651-8196-2B47-ACFF-17A9B60DD80B}"/>
+                <a16:creationId xmlns="" xmlns:a16="http://schemas.microsoft.com/office/drawing/2014/main" id="{928E8651-8196-2B47-ACFF-17A9B60DD80B}"/>
               </a:ext>
             </a:extLst>
           </p:cNvPr>
@@ -2956,7 +2956,7 @@
           <p:cNvPr id="9" name="Datumsplatzhalter 8">
             <a:extLst>
               <a:ext uri="{FF2B5EF4-FFF2-40B4-BE49-F238E27FC236}">
-                <a16:creationId xmlns:a16="http://schemas.microsoft.com/office/drawing/2014/main" xmlns="" id="{908931CD-3FC1-6D4A-9D97-7B9D9B6029D7}"/>
+                <a16:creationId xmlns="" xmlns:a16="http://schemas.microsoft.com/office/drawing/2014/main" id="{908931CD-3FC1-6D4A-9D97-7B9D9B6029D7}"/>
               </a:ext>
             </a:extLst>
           </p:cNvPr>
@@ -2985,7 +2985,7 @@
           <p:cNvPr id="10" name="Fußzeilenplatzhalter 9">
             <a:extLst>
               <a:ext uri="{FF2B5EF4-FFF2-40B4-BE49-F238E27FC236}">
-                <a16:creationId xmlns:a16="http://schemas.microsoft.com/office/drawing/2014/main" xmlns="" id="{B72D7D88-85F7-EC49-B4C6-3ED8F5D66BC5}"/>
+                <a16:creationId xmlns="" xmlns:a16="http://schemas.microsoft.com/office/drawing/2014/main" id="{B72D7D88-85F7-EC49-B4C6-3ED8F5D66BC5}"/>
               </a:ext>
             </a:extLst>
           </p:cNvPr>
@@ -3014,7 +3014,7 @@
           <p:cNvPr id="11" name="Foliennummernplatzhalter 10">
             <a:extLst>
               <a:ext uri="{FF2B5EF4-FFF2-40B4-BE49-F238E27FC236}">
-                <a16:creationId xmlns:a16="http://schemas.microsoft.com/office/drawing/2014/main" xmlns="" id="{63E18A59-59B5-4B49-B2FA-57CC2D0813FC}"/>
+                <a16:creationId xmlns="" xmlns:a16="http://schemas.microsoft.com/office/drawing/2014/main" id="{63E18A59-59B5-4B49-B2FA-57CC2D0813FC}"/>
               </a:ext>
             </a:extLst>
           </p:cNvPr>
@@ -3249,7 +3249,7 @@
           <p:cNvPr id="2" name="Datumsplatzhalter 1">
             <a:extLst>
               <a:ext uri="{FF2B5EF4-FFF2-40B4-BE49-F238E27FC236}">
-                <a16:creationId xmlns:a16="http://schemas.microsoft.com/office/drawing/2014/main" xmlns="" id="{90908A56-4B20-474C-8B1D-C606A833A2B4}"/>
+                <a16:creationId xmlns="" xmlns:a16="http://schemas.microsoft.com/office/drawing/2014/main" id="{90908A56-4B20-474C-8B1D-C606A833A2B4}"/>
               </a:ext>
             </a:extLst>
           </p:cNvPr>
@@ -3278,7 +3278,7 @@
           <p:cNvPr id="9" name="Fußzeilenplatzhalter 8">
             <a:extLst>
               <a:ext uri="{FF2B5EF4-FFF2-40B4-BE49-F238E27FC236}">
-                <a16:creationId xmlns:a16="http://schemas.microsoft.com/office/drawing/2014/main" xmlns="" id="{05514699-F45F-CE46-9F96-CA29803F0B34}"/>
+                <a16:creationId xmlns="" xmlns:a16="http://schemas.microsoft.com/office/drawing/2014/main" id="{05514699-F45F-CE46-9F96-CA29803F0B34}"/>
               </a:ext>
             </a:extLst>
           </p:cNvPr>
@@ -3307,7 +3307,7 @@
           <p:cNvPr id="10" name="Foliennummernplatzhalter 9">
             <a:extLst>
               <a:ext uri="{FF2B5EF4-FFF2-40B4-BE49-F238E27FC236}">
-                <a16:creationId xmlns:a16="http://schemas.microsoft.com/office/drawing/2014/main" xmlns="" id="{2FBF68FC-4B9C-3B4E-85D0-4724A1097039}"/>
+                <a16:creationId xmlns="" xmlns:a16="http://schemas.microsoft.com/office/drawing/2014/main" id="{2FBF68FC-4B9C-3B4E-85D0-4724A1097039}"/>
               </a:ext>
             </a:extLst>
           </p:cNvPr>
@@ -4064,7 +4064,7 @@
   </p:txStyles>
   <p:extLst mod="1">
     <p:ext uri="{27BBF7A9-308A-43DC-89C8-2F10F3537804}">
-      <p15:sldGuideLst xmlns:p15="http://schemas.microsoft.com/office/powerpoint/2012/main" xmlns="">
+      <p15:sldGuideLst xmlns="" xmlns:p15="http://schemas.microsoft.com/office/powerpoint/2012/main">
         <p15:guide id="1" orient="horz" pos="2160" userDrawn="1">
           <p15:clr>
             <a:srgbClr val="F26B43"/>
@@ -4562,7 +4562,17 @@
           <a:bodyPr/>
           <a:lstStyle/>
           <a:p>
-            <a:endParaRPr lang="de-DE"/>
+            <a:r>
+              <a:rPr lang="de-DE" dirty="0" smtClean="0"/>
+              <a:t>Zentrale Konfiguration, sämtliche Services werden über diese separate Anwendung konfiguriert</a:t>
+            </a:r>
+          </a:p>
+          <a:p>
+            <a:r>
+              <a:rPr lang="de-DE" dirty="0" smtClean="0"/>
+              <a:t>Web Server</a:t>
+            </a:r>
+            <a:endParaRPr lang="de-DE" dirty="0"/>
           </a:p>
         </p:txBody>
       </p:sp>
@@ -4715,6 +4725,78 @@
             <a:r>
               <a:rPr lang="de-DE" dirty="0" err="1" smtClean="0"/>
               <a:t>solution-cloud_config</a:t>
+            </a:r>
+            <a:endParaRPr lang="de-DE" dirty="0" smtClean="0"/>
+          </a:p>
+          <a:p>
+            <a:endParaRPr lang="de-DE" dirty="0"/>
+          </a:p>
+          <a:p>
+            <a:r>
+              <a:rPr lang="de-DE" dirty="0" err="1" smtClean="0"/>
+              <a:t>ToDo</a:t>
+            </a:r>
+            <a:r>
+              <a:rPr lang="de-DE" dirty="0" smtClean="0"/>
+              <a:t>: </a:t>
+            </a:r>
+          </a:p>
+          <a:p>
+            <a:pPr lvl="1"/>
+            <a:r>
+              <a:rPr lang="de-DE" dirty="0" err="1" smtClean="0"/>
+              <a:t>Git</a:t>
+            </a:r>
+            <a:r>
+              <a:rPr lang="de-DE" dirty="0" smtClean="0"/>
+              <a:t>-Repository für die Properties-Dateien</a:t>
+            </a:r>
+            <a:endParaRPr lang="de-DE" dirty="0"/>
+          </a:p>
+          <a:p>
+            <a:pPr lvl="1"/>
+            <a:r>
+              <a:rPr lang="de-DE" dirty="0" err="1" smtClean="0"/>
+              <a:t>Config</a:t>
+            </a:r>
+            <a:r>
+              <a:rPr lang="de-DE" dirty="0" smtClean="0"/>
+              <a:t>-Server starten als Spring Boot </a:t>
+            </a:r>
+            <a:r>
+              <a:rPr lang="de-DE" dirty="0" err="1" smtClean="0"/>
+              <a:t>Application</a:t>
+            </a:r>
+            <a:endParaRPr lang="de-DE" dirty="0" smtClean="0"/>
+          </a:p>
+          <a:p>
+            <a:pPr lvl="1"/>
+            <a:r>
+              <a:rPr lang="de-DE" dirty="0" smtClean="0"/>
+              <a:t>Services müssen </a:t>
+            </a:r>
+            <a:r>
+              <a:rPr lang="de-DE" dirty="0" err="1" smtClean="0"/>
+              <a:t>umkonfiguriert</a:t>
+            </a:r>
+            <a:endParaRPr lang="de-DE" dirty="0" smtClean="0"/>
+          </a:p>
+          <a:p>
+            <a:pPr lvl="2"/>
+            <a:r>
+              <a:rPr lang="de-DE" dirty="0" err="1" smtClean="0"/>
+              <a:t>pom</a:t>
+            </a:r>
+            <a:r>
+              <a:rPr lang="de-DE" dirty="0" smtClean="0"/>
+              <a:t> </a:t>
+            </a:r>
+          </a:p>
+          <a:p>
+            <a:pPr lvl="2"/>
+            <a:r>
+              <a:rPr lang="de-DE" smtClean="0"/>
+              <a:t>application.properties</a:t>
             </a:r>
             <a:endParaRPr lang="de-DE" dirty="0"/>
           </a:p>
@@ -6929,18 +7011,14 @@
           <a:p>
             <a:pPr lvl="3"/>
             <a:r>
-              <a:rPr lang="de-DE"/>
-              <a:t>Chat </a:t>
-            </a:r>
-            <a:r>
-              <a:rPr lang="de-DE"/>
-              <a:t>oder </a:t>
-            </a:r>
-            <a:r>
-              <a:rPr lang="de-DE" smtClean="0"/>
+              <a:rPr lang="de-DE" dirty="0"/>
+              <a:t>Chat oder </a:t>
+            </a:r>
+            <a:r>
+              <a:rPr lang="de-DE" dirty="0" smtClean="0"/>
               <a:t>Wortmeldung</a:t>
             </a:r>
-            <a:endParaRPr lang="de-DE"/>
+            <a:endParaRPr lang="de-DE" dirty="0"/>
           </a:p>
         </p:txBody>
       </p:sp>
@@ -8757,7 +8835,7 @@
   <a:extraClrSchemeLst/>
   <a:extLst>
     <a:ext uri="{05A4C25C-085E-4340-85A3-A5531E510DB2}">
-      <thm15:themeFamily xmlns:thm15="http://schemas.microsoft.com/office/thememl/2012/main" xmlns="" name="Präsentation1" id="{F43A950C-3817-CB49-B35A-A5282E14158E}" vid="{E0337DBD-E2EB-B74A-BCD1-B718ED0C7F88}"/>
+      <thm15:themeFamily xmlns="" xmlns:thm15="http://schemas.microsoft.com/office/thememl/2012/main" name="Präsentation1" id="{F43A950C-3817-CB49-B35A-A5282E14158E}" vid="{E0337DBD-E2EB-B74A-BCD1-B718ED0C7F88}"/>
     </a:ext>
   </a:extLst>
 </a:theme>

</xml_diff>